<commit_message>
Added transfer learning info
</commit_message>
<xml_diff>
--- a/Slides_5.pptx
+++ b/Slides_5.pptx
@@ -4,8 +4,13 @@
   <p:sldMasterIdLst>
     <p:sldMasterId id="2147483648" r:id="rId1"/>
   </p:sldMasterIdLst>
+  <p:notesMasterIdLst>
+    <p:notesMasterId r:id="rId5"/>
+  </p:notesMasterIdLst>
   <p:sldIdLst>
     <p:sldId id="256" r:id="rId2"/>
+    <p:sldId id="257" r:id="rId3"/>
+    <p:sldId id="258" r:id="rId4"/>
   </p:sldIdLst>
   <p:sldSz cx="12192000" cy="6858000"/>
   <p:notesSz cx="6858000" cy="9144000"/>
@@ -105,6 +110,489 @@
     </a:lvl9pPr>
   </p:defaultTextStyle>
 </p:presentation>
+</file>
+
+<file path=ppt/notesMasters/notesMaster1.xml><?xml version="1.0" encoding="utf-8"?>
+<p:notesMaster xmlns:a="http://schemas.openxmlformats.org/drawingml/2006/main" xmlns:r="http://schemas.openxmlformats.org/officeDocument/2006/relationships" xmlns:p="http://schemas.openxmlformats.org/presentationml/2006/main">
+  <p:cSld>
+    <p:bg>
+      <p:bgRef idx="1001">
+        <a:schemeClr val="bg1"/>
+      </p:bgRef>
+    </p:bg>
+    <p:spTree>
+      <p:nvGrpSpPr>
+        <p:cNvPr id="1" name=""/>
+        <p:cNvGrpSpPr/>
+        <p:nvPr/>
+      </p:nvGrpSpPr>
+      <p:grpSpPr>
+        <a:xfrm>
+          <a:off x="0" y="0"/>
+          <a:ext cx="0" cy="0"/>
+          <a:chOff x="0" y="0"/>
+          <a:chExt cx="0" cy="0"/>
+        </a:xfrm>
+      </p:grpSpPr>
+      <p:sp>
+        <p:nvSpPr>
+          <p:cNvPr id="2" name="Header Placeholder 1"/>
+          <p:cNvSpPr>
+            <a:spLocks noGrp="1"/>
+          </p:cNvSpPr>
+          <p:nvPr>
+            <p:ph type="hdr" sz="quarter"/>
+          </p:nvPr>
+        </p:nvSpPr>
+        <p:spPr>
+          <a:xfrm>
+            <a:off x="0" y="0"/>
+            <a:ext cx="2971800" cy="458788"/>
+          </a:xfrm>
+          <a:prstGeom prst="rect">
+            <a:avLst/>
+          </a:prstGeom>
+        </p:spPr>
+        <p:txBody>
+          <a:bodyPr vert="horz" lIns="91440" tIns="45720" rIns="91440" bIns="45720" rtlCol="0"/>
+          <a:lstStyle>
+            <a:lvl1pPr algn="l">
+              <a:defRPr sz="1200"/>
+            </a:lvl1pPr>
+          </a:lstStyle>
+          <a:p>
+            <a:endParaRPr lang="fr-FR"/>
+          </a:p>
+        </p:txBody>
+      </p:sp>
+      <p:sp>
+        <p:nvSpPr>
+          <p:cNvPr id="3" name="Date Placeholder 2"/>
+          <p:cNvSpPr>
+            <a:spLocks noGrp="1"/>
+          </p:cNvSpPr>
+          <p:nvPr>
+            <p:ph type="dt" idx="1"/>
+          </p:nvPr>
+        </p:nvSpPr>
+        <p:spPr>
+          <a:xfrm>
+            <a:off x="3884613" y="0"/>
+            <a:ext cx="2971800" cy="458788"/>
+          </a:xfrm>
+          <a:prstGeom prst="rect">
+            <a:avLst/>
+          </a:prstGeom>
+        </p:spPr>
+        <p:txBody>
+          <a:bodyPr vert="horz" lIns="91440" tIns="45720" rIns="91440" bIns="45720" rtlCol="0"/>
+          <a:lstStyle>
+            <a:lvl1pPr algn="r">
+              <a:defRPr sz="1200"/>
+            </a:lvl1pPr>
+          </a:lstStyle>
+          <a:p>
+            <a:fld id="{8D847F30-6D87-4FF5-AB60-09A63558FD47}" type="datetimeFigureOut">
+              <a:rPr lang="fr-FR" smtClean="0"/>
+              <a:t>22/01/2023</a:t>
+            </a:fld>
+            <a:endParaRPr lang="fr-FR"/>
+          </a:p>
+        </p:txBody>
+      </p:sp>
+      <p:sp>
+        <p:nvSpPr>
+          <p:cNvPr id="4" name="Slide Image Placeholder 3"/>
+          <p:cNvSpPr>
+            <a:spLocks noGrp="1" noRot="1" noChangeAspect="1"/>
+          </p:cNvSpPr>
+          <p:nvPr>
+            <p:ph type="sldImg" idx="2"/>
+          </p:nvPr>
+        </p:nvSpPr>
+        <p:spPr>
+          <a:xfrm>
+            <a:off x="685800" y="1143000"/>
+            <a:ext cx="5486400" cy="3086100"/>
+          </a:xfrm>
+          <a:prstGeom prst="rect">
+            <a:avLst/>
+          </a:prstGeom>
+          <a:noFill/>
+          <a:ln w="12700">
+            <a:solidFill>
+              <a:prstClr val="black"/>
+            </a:solidFill>
+          </a:ln>
+        </p:spPr>
+        <p:txBody>
+          <a:bodyPr vert="horz" lIns="91440" tIns="45720" rIns="91440" bIns="45720" rtlCol="0" anchor="ctr"/>
+          <a:lstStyle/>
+          <a:p>
+            <a:endParaRPr lang="fr-FR"/>
+          </a:p>
+        </p:txBody>
+      </p:sp>
+      <p:sp>
+        <p:nvSpPr>
+          <p:cNvPr id="5" name="Notes Placeholder 4"/>
+          <p:cNvSpPr>
+            <a:spLocks noGrp="1"/>
+          </p:cNvSpPr>
+          <p:nvPr>
+            <p:ph type="body" sz="quarter" idx="3"/>
+          </p:nvPr>
+        </p:nvSpPr>
+        <p:spPr>
+          <a:xfrm>
+            <a:off x="685800" y="4400550"/>
+            <a:ext cx="5486400" cy="3600450"/>
+          </a:xfrm>
+          <a:prstGeom prst="rect">
+            <a:avLst/>
+          </a:prstGeom>
+        </p:spPr>
+        <p:txBody>
+          <a:bodyPr vert="horz" lIns="91440" tIns="45720" rIns="91440" bIns="45720" rtlCol="0"/>
+          <a:lstStyle/>
+          <a:p>
+            <a:pPr lvl="0"/>
+            <a:r>
+              <a:rPr lang="en-US"/>
+              <a:t>Click to edit Master text styles</a:t>
+            </a:r>
+          </a:p>
+          <a:p>
+            <a:pPr lvl="1"/>
+            <a:r>
+              <a:rPr lang="en-US"/>
+              <a:t>Second level</a:t>
+            </a:r>
+          </a:p>
+          <a:p>
+            <a:pPr lvl="2"/>
+            <a:r>
+              <a:rPr lang="en-US"/>
+              <a:t>Third level</a:t>
+            </a:r>
+          </a:p>
+          <a:p>
+            <a:pPr lvl="3"/>
+            <a:r>
+              <a:rPr lang="en-US"/>
+              <a:t>Fourth level</a:t>
+            </a:r>
+          </a:p>
+          <a:p>
+            <a:pPr lvl="4"/>
+            <a:r>
+              <a:rPr lang="en-US"/>
+              <a:t>Fifth level</a:t>
+            </a:r>
+            <a:endParaRPr lang="fr-FR"/>
+          </a:p>
+        </p:txBody>
+      </p:sp>
+      <p:sp>
+        <p:nvSpPr>
+          <p:cNvPr id="6" name="Footer Placeholder 5"/>
+          <p:cNvSpPr>
+            <a:spLocks noGrp="1"/>
+          </p:cNvSpPr>
+          <p:nvPr>
+            <p:ph type="ftr" sz="quarter" idx="4"/>
+          </p:nvPr>
+        </p:nvSpPr>
+        <p:spPr>
+          <a:xfrm>
+            <a:off x="0" y="8685213"/>
+            <a:ext cx="2971800" cy="458787"/>
+          </a:xfrm>
+          <a:prstGeom prst="rect">
+            <a:avLst/>
+          </a:prstGeom>
+        </p:spPr>
+        <p:txBody>
+          <a:bodyPr vert="horz" lIns="91440" tIns="45720" rIns="91440" bIns="45720" rtlCol="0" anchor="b"/>
+          <a:lstStyle>
+            <a:lvl1pPr algn="l">
+              <a:defRPr sz="1200"/>
+            </a:lvl1pPr>
+          </a:lstStyle>
+          <a:p>
+            <a:endParaRPr lang="fr-FR"/>
+          </a:p>
+        </p:txBody>
+      </p:sp>
+      <p:sp>
+        <p:nvSpPr>
+          <p:cNvPr id="7" name="Slide Number Placeholder 6"/>
+          <p:cNvSpPr>
+            <a:spLocks noGrp="1"/>
+          </p:cNvSpPr>
+          <p:nvPr>
+            <p:ph type="sldNum" sz="quarter" idx="5"/>
+          </p:nvPr>
+        </p:nvSpPr>
+        <p:spPr>
+          <a:xfrm>
+            <a:off x="3884613" y="8685213"/>
+            <a:ext cx="2971800" cy="458787"/>
+          </a:xfrm>
+          <a:prstGeom prst="rect">
+            <a:avLst/>
+          </a:prstGeom>
+        </p:spPr>
+        <p:txBody>
+          <a:bodyPr vert="horz" lIns="91440" tIns="45720" rIns="91440" bIns="45720" rtlCol="0" anchor="b"/>
+          <a:lstStyle>
+            <a:lvl1pPr algn="r">
+              <a:defRPr sz="1200"/>
+            </a:lvl1pPr>
+          </a:lstStyle>
+          <a:p>
+            <a:fld id="{36828A07-D046-4481-98A0-46C92F81D437}" type="slidenum">
+              <a:rPr lang="fr-FR" smtClean="0"/>
+              <a:t>‹#›</a:t>
+            </a:fld>
+            <a:endParaRPr lang="fr-FR"/>
+          </a:p>
+        </p:txBody>
+      </p:sp>
+    </p:spTree>
+    <p:extLst>
+      <p:ext uri="{BB962C8B-B14F-4D97-AF65-F5344CB8AC3E}">
+        <p14:creationId xmlns:p14="http://schemas.microsoft.com/office/powerpoint/2010/main" val="1422178161"/>
+      </p:ext>
+    </p:extLst>
+  </p:cSld>
+  <p:clrMap bg1="lt1" tx1="dk1" bg2="lt2" tx2="dk2" accent1="accent1" accent2="accent2" accent3="accent3" accent4="accent4" accent5="accent5" accent6="accent6" hlink="hlink" folHlink="folHlink"/>
+  <p:notesStyle>
+    <a:lvl1pPr marL="0" algn="l" defTabSz="914400" rtl="0" eaLnBrk="1" latinLnBrk="0" hangingPunct="1">
+      <a:defRPr sz="1200" kern="1200">
+        <a:solidFill>
+          <a:schemeClr val="tx1"/>
+        </a:solidFill>
+        <a:latin typeface="+mn-lt"/>
+        <a:ea typeface="+mn-ea"/>
+        <a:cs typeface="+mn-cs"/>
+      </a:defRPr>
+    </a:lvl1pPr>
+    <a:lvl2pPr marL="457200" algn="l" defTabSz="914400" rtl="0" eaLnBrk="1" latinLnBrk="0" hangingPunct="1">
+      <a:defRPr sz="1200" kern="1200">
+        <a:solidFill>
+          <a:schemeClr val="tx1"/>
+        </a:solidFill>
+        <a:latin typeface="+mn-lt"/>
+        <a:ea typeface="+mn-ea"/>
+        <a:cs typeface="+mn-cs"/>
+      </a:defRPr>
+    </a:lvl2pPr>
+    <a:lvl3pPr marL="914400" algn="l" defTabSz="914400" rtl="0" eaLnBrk="1" latinLnBrk="0" hangingPunct="1">
+      <a:defRPr sz="1200" kern="1200">
+        <a:solidFill>
+          <a:schemeClr val="tx1"/>
+        </a:solidFill>
+        <a:latin typeface="+mn-lt"/>
+        <a:ea typeface="+mn-ea"/>
+        <a:cs typeface="+mn-cs"/>
+      </a:defRPr>
+    </a:lvl3pPr>
+    <a:lvl4pPr marL="1371600" algn="l" defTabSz="914400" rtl="0" eaLnBrk="1" latinLnBrk="0" hangingPunct="1">
+      <a:defRPr sz="1200" kern="1200">
+        <a:solidFill>
+          <a:schemeClr val="tx1"/>
+        </a:solidFill>
+        <a:latin typeface="+mn-lt"/>
+        <a:ea typeface="+mn-ea"/>
+        <a:cs typeface="+mn-cs"/>
+      </a:defRPr>
+    </a:lvl4pPr>
+    <a:lvl5pPr marL="1828800" algn="l" defTabSz="914400" rtl="0" eaLnBrk="1" latinLnBrk="0" hangingPunct="1">
+      <a:defRPr sz="1200" kern="1200">
+        <a:solidFill>
+          <a:schemeClr val="tx1"/>
+        </a:solidFill>
+        <a:latin typeface="+mn-lt"/>
+        <a:ea typeface="+mn-ea"/>
+        <a:cs typeface="+mn-cs"/>
+      </a:defRPr>
+    </a:lvl5pPr>
+    <a:lvl6pPr marL="2286000" algn="l" defTabSz="914400" rtl="0" eaLnBrk="1" latinLnBrk="0" hangingPunct="1">
+      <a:defRPr sz="1200" kern="1200">
+        <a:solidFill>
+          <a:schemeClr val="tx1"/>
+        </a:solidFill>
+        <a:latin typeface="+mn-lt"/>
+        <a:ea typeface="+mn-ea"/>
+        <a:cs typeface="+mn-cs"/>
+      </a:defRPr>
+    </a:lvl6pPr>
+    <a:lvl7pPr marL="2743200" algn="l" defTabSz="914400" rtl="0" eaLnBrk="1" latinLnBrk="0" hangingPunct="1">
+      <a:defRPr sz="1200" kern="1200">
+        <a:solidFill>
+          <a:schemeClr val="tx1"/>
+        </a:solidFill>
+        <a:latin typeface="+mn-lt"/>
+        <a:ea typeface="+mn-ea"/>
+        <a:cs typeface="+mn-cs"/>
+      </a:defRPr>
+    </a:lvl7pPr>
+    <a:lvl8pPr marL="3200400" algn="l" defTabSz="914400" rtl="0" eaLnBrk="1" latinLnBrk="0" hangingPunct="1">
+      <a:defRPr sz="1200" kern="1200">
+        <a:solidFill>
+          <a:schemeClr val="tx1"/>
+        </a:solidFill>
+        <a:latin typeface="+mn-lt"/>
+        <a:ea typeface="+mn-ea"/>
+        <a:cs typeface="+mn-cs"/>
+      </a:defRPr>
+    </a:lvl8pPr>
+    <a:lvl9pPr marL="3657600" algn="l" defTabSz="914400" rtl="0" eaLnBrk="1" latinLnBrk="0" hangingPunct="1">
+      <a:defRPr sz="1200" kern="1200">
+        <a:solidFill>
+          <a:schemeClr val="tx1"/>
+        </a:solidFill>
+        <a:latin typeface="+mn-lt"/>
+        <a:ea typeface="+mn-ea"/>
+        <a:cs typeface="+mn-cs"/>
+      </a:defRPr>
+    </a:lvl9pPr>
+  </p:notesStyle>
+</p:notesMaster>
+</file>
+
+<file path=ppt/notesSlides/notesSlide1.xml><?xml version="1.0" encoding="utf-8"?>
+<p:notes xmlns:a="http://schemas.openxmlformats.org/drawingml/2006/main" xmlns:r="http://schemas.openxmlformats.org/officeDocument/2006/relationships" xmlns:p="http://schemas.openxmlformats.org/presentationml/2006/main">
+  <p:cSld>
+    <p:spTree>
+      <p:nvGrpSpPr>
+        <p:cNvPr id="1" name=""/>
+        <p:cNvGrpSpPr/>
+        <p:nvPr/>
+      </p:nvGrpSpPr>
+      <p:grpSpPr>
+        <a:xfrm>
+          <a:off x="0" y="0"/>
+          <a:ext cx="0" cy="0"/>
+          <a:chOff x="0" y="0"/>
+          <a:chExt cx="0" cy="0"/>
+        </a:xfrm>
+      </p:grpSpPr>
+      <p:sp>
+        <p:nvSpPr>
+          <p:cNvPr id="2" name="Slide Image Placeholder 1"/>
+          <p:cNvSpPr>
+            <a:spLocks noGrp="1" noRot="1" noChangeAspect="1"/>
+          </p:cNvSpPr>
+          <p:nvPr>
+            <p:ph type="sldImg"/>
+          </p:nvPr>
+        </p:nvSpPr>
+        <p:spPr/>
+      </p:sp>
+      <p:sp>
+        <p:nvSpPr>
+          <p:cNvPr id="3" name="Notes Placeholder 2"/>
+          <p:cNvSpPr>
+            <a:spLocks noGrp="1"/>
+          </p:cNvSpPr>
+          <p:nvPr>
+            <p:ph type="body" idx="1"/>
+          </p:nvPr>
+        </p:nvSpPr>
+        <p:spPr/>
+        <p:txBody>
+          <a:bodyPr/>
+          <a:lstStyle/>
+          <a:p>
+            <a:pPr algn="l"/>
+            <a:r>
+              <a:rPr lang="en-US" b="0" i="0" dirty="0">
+                <a:solidFill>
+                  <a:srgbClr val="D1D5DB"/>
+                </a:solidFill>
+                <a:effectLst/>
+                <a:latin typeface="Söhne"/>
+              </a:rPr>
+              <a:t>In transfer learning, it's common to use pre-trained weights for the majority of the model and then fine-tune only a subset of the layers. This is because the lower layers* of a deep neural network tend to learn more general features, such as edges and textures, which are useful for a wide range of tasks. The higher layers*, on the other hand, tend to learn more task-specific features, such as object parts or object classes. Therefore, it's typically beneficial to keep the pre-trained weights for the lower layers*, while retraining the higher layers* to adapt them to the new task.</a:t>
+            </a:r>
+          </a:p>
+          <a:p>
+            <a:pPr algn="l"/>
+            <a:endParaRPr lang="en-US" b="0" i="0" dirty="0">
+              <a:solidFill>
+                <a:srgbClr val="D1D5DB"/>
+              </a:solidFill>
+              <a:effectLst/>
+              <a:latin typeface="Söhne"/>
+            </a:endParaRPr>
+          </a:p>
+          <a:p>
+            <a:pPr algn="l"/>
+            <a:r>
+              <a:rPr lang="en-US" b="0" i="0" dirty="0">
+                <a:solidFill>
+                  <a:srgbClr val="D1D5DB"/>
+                </a:solidFill>
+                <a:effectLst/>
+                <a:latin typeface="Söhne"/>
+              </a:rPr>
+              <a:t>However, it is not always necessary to retrain all the layers, it depends on the size of the dataset, the similarity between the old task and the new task, the computational resources and other factors. The choice of which layers to retrain and which to keep frozen can be determined through experimentation, such as by comparing the performance of different model configurations. That choice is a hyperparameter (again!).</a:t>
+            </a:r>
+          </a:p>
+          <a:p>
+            <a:endParaRPr lang="fr-FR" dirty="0"/>
+          </a:p>
+          <a:p>
+            <a:r>
+              <a:rPr lang="en-US" b="0" i="0">
+                <a:solidFill>
+                  <a:srgbClr val="D1D5DB"/>
+                </a:solidFill>
+                <a:effectLst/>
+                <a:latin typeface="Söhne"/>
+              </a:rPr>
+              <a:t>* The first layers, closest to the input, are referred to as the lower layers, while the last layers, closest to the output, are referred to as the higher layers.</a:t>
+            </a:r>
+            <a:endParaRPr lang="fr-FR" dirty="0"/>
+          </a:p>
+        </p:txBody>
+      </p:sp>
+      <p:sp>
+        <p:nvSpPr>
+          <p:cNvPr id="4" name="Slide Number Placeholder 3"/>
+          <p:cNvSpPr>
+            <a:spLocks noGrp="1"/>
+          </p:cNvSpPr>
+          <p:nvPr>
+            <p:ph type="sldNum" sz="quarter" idx="5"/>
+          </p:nvPr>
+        </p:nvSpPr>
+        <p:spPr/>
+        <p:txBody>
+          <a:bodyPr/>
+          <a:lstStyle/>
+          <a:p>
+            <a:fld id="{36828A07-D046-4481-98A0-46C92F81D437}" type="slidenum">
+              <a:rPr lang="fr-FR" smtClean="0"/>
+              <a:t>3</a:t>
+            </a:fld>
+            <a:endParaRPr lang="fr-FR"/>
+          </a:p>
+        </p:txBody>
+      </p:sp>
+    </p:spTree>
+    <p:extLst>
+      <p:ext uri="{BB962C8B-B14F-4D97-AF65-F5344CB8AC3E}">
+        <p14:creationId xmlns:p14="http://schemas.microsoft.com/office/powerpoint/2010/main" val="2244484092"/>
+      </p:ext>
+    </p:extLst>
+  </p:cSld>
+  <p:clrMapOvr>
+    <a:masterClrMapping/>
+  </p:clrMapOvr>
+</p:notes>
 </file>
 
 <file path=ppt/slideLayouts/slideLayout1.xml><?xml version="1.0" encoding="utf-8"?>
@@ -3429,6 +3917,341 @@
 </p:sld>
 </file>
 
+<file path=ppt/slides/slide2.xml><?xml version="1.0" encoding="utf-8"?>
+<p:sld xmlns:a="http://schemas.openxmlformats.org/drawingml/2006/main" xmlns:r="http://schemas.openxmlformats.org/officeDocument/2006/relationships" xmlns:p="http://schemas.openxmlformats.org/presentationml/2006/main">
+  <p:cSld>
+    <p:spTree>
+      <p:nvGrpSpPr>
+        <p:cNvPr id="1" name=""/>
+        <p:cNvGrpSpPr/>
+        <p:nvPr/>
+      </p:nvGrpSpPr>
+      <p:grpSpPr>
+        <a:xfrm>
+          <a:off x="0" y="0"/>
+          <a:ext cx="0" cy="0"/>
+          <a:chOff x="0" y="0"/>
+          <a:chExt cx="0" cy="0"/>
+        </a:xfrm>
+      </p:grpSpPr>
+      <p:sp>
+        <p:nvSpPr>
+          <p:cNvPr id="2" name="Title 1">
+            <a:extLst>
+              <a:ext uri="{FF2B5EF4-FFF2-40B4-BE49-F238E27FC236}">
+                <a16:creationId xmlns:a16="http://schemas.microsoft.com/office/drawing/2014/main" id="{F48A5DF5-9273-5D6E-84BD-2AF0BF7C3792}"/>
+              </a:ext>
+            </a:extLst>
+          </p:cNvPr>
+          <p:cNvSpPr>
+            <a:spLocks noGrp="1"/>
+          </p:cNvSpPr>
+          <p:nvPr>
+            <p:ph type="title"/>
+          </p:nvPr>
+        </p:nvSpPr>
+        <p:spPr/>
+        <p:txBody>
+          <a:bodyPr/>
+          <a:lstStyle/>
+          <a:p>
+            <a:r>
+              <a:rPr lang="en-GB" dirty="0"/>
+              <a:t>What is transfer learning</a:t>
+            </a:r>
+          </a:p>
+        </p:txBody>
+      </p:sp>
+      <p:sp>
+        <p:nvSpPr>
+          <p:cNvPr id="3" name="Content Placeholder 2">
+            <a:extLst>
+              <a:ext uri="{FF2B5EF4-FFF2-40B4-BE49-F238E27FC236}">
+                <a16:creationId xmlns:a16="http://schemas.microsoft.com/office/drawing/2014/main" id="{78DE23D1-93AB-510E-44AD-3DEF6577A04B}"/>
+              </a:ext>
+            </a:extLst>
+          </p:cNvPr>
+          <p:cNvSpPr>
+            <a:spLocks noGrp="1"/>
+          </p:cNvSpPr>
+          <p:nvPr>
+            <p:ph idx="1"/>
+          </p:nvPr>
+        </p:nvSpPr>
+        <p:spPr/>
+        <p:txBody>
+          <a:bodyPr/>
+          <a:lstStyle/>
+          <a:p>
+            <a:pPr algn="just"/>
+            <a:r>
+              <a:rPr lang="en-US" dirty="0"/>
+              <a:t>Reuse a model trained on one task as the starting point for a model on a second task</a:t>
+            </a:r>
+          </a:p>
+          <a:p>
+            <a:pPr algn="just"/>
+            <a:r>
+              <a:rPr lang="en-US" dirty="0"/>
+              <a:t>Allows the second model to benefit from the knowledge learned by the first model</a:t>
+            </a:r>
+          </a:p>
+          <a:p>
+            <a:pPr algn="just"/>
+            <a:r>
+              <a:rPr lang="en-US" dirty="0"/>
+              <a:t>Can lead to faster training times and improved performance on the second task</a:t>
+            </a:r>
+          </a:p>
+        </p:txBody>
+      </p:sp>
+    </p:spTree>
+    <p:extLst>
+      <p:ext uri="{BB962C8B-B14F-4D97-AF65-F5344CB8AC3E}">
+        <p14:creationId xmlns:p14="http://schemas.microsoft.com/office/powerpoint/2010/main" val="2308263640"/>
+      </p:ext>
+    </p:extLst>
+  </p:cSld>
+  <p:clrMapOvr>
+    <a:masterClrMapping/>
+  </p:clrMapOvr>
+  <p:timing>
+    <p:tnLst>
+      <p:par>
+        <p:cTn id="1" dur="indefinite" restart="never" nodeType="tmRoot">
+          <p:childTnLst>
+            <p:seq concurrent="1" nextAc="seek">
+              <p:cTn id="2" dur="indefinite" nodeType="mainSeq">
+                <p:childTnLst>
+                  <p:par>
+                    <p:cTn id="3" fill="hold">
+                      <p:stCondLst>
+                        <p:cond delay="indefinite"/>
+                      </p:stCondLst>
+                      <p:childTnLst>
+                        <p:par>
+                          <p:cTn id="4" fill="hold">
+                            <p:stCondLst>
+                              <p:cond delay="0"/>
+                            </p:stCondLst>
+                            <p:childTnLst>
+                              <p:par>
+                                <p:cTn id="5" presetID="10" presetClass="entr" presetSubtype="0" fill="hold" nodeType="clickEffect">
+                                  <p:stCondLst>
+                                    <p:cond delay="0"/>
+                                  </p:stCondLst>
+                                  <p:childTnLst>
+                                    <p:set>
+                                      <p:cBhvr>
+                                        <p:cTn id="6" dur="1" fill="hold">
+                                          <p:stCondLst>
+                                            <p:cond delay="0"/>
+                                          </p:stCondLst>
+                                        </p:cTn>
+                                        <p:tgtEl>
+                                          <p:spTgt spid="3">
+                                            <p:txEl>
+                                              <p:pRg st="1" end="1"/>
+                                            </p:txEl>
+                                          </p:spTgt>
+                                        </p:tgtEl>
+                                        <p:attrNameLst>
+                                          <p:attrName>style.visibility</p:attrName>
+                                        </p:attrNameLst>
+                                      </p:cBhvr>
+                                      <p:to>
+                                        <p:strVal val="visible"/>
+                                      </p:to>
+                                    </p:set>
+                                    <p:animEffect transition="in" filter="fade">
+                                      <p:cBhvr>
+                                        <p:cTn id="7" dur="500"/>
+                                        <p:tgtEl>
+                                          <p:spTgt spid="3">
+                                            <p:txEl>
+                                              <p:pRg st="1" end="1"/>
+                                            </p:txEl>
+                                          </p:spTgt>
+                                        </p:tgtEl>
+                                      </p:cBhvr>
+                                    </p:animEffect>
+                                  </p:childTnLst>
+                                </p:cTn>
+                              </p:par>
+                            </p:childTnLst>
+                          </p:cTn>
+                        </p:par>
+                      </p:childTnLst>
+                    </p:cTn>
+                  </p:par>
+                  <p:par>
+                    <p:cTn id="8" fill="hold">
+                      <p:stCondLst>
+                        <p:cond delay="indefinite"/>
+                      </p:stCondLst>
+                      <p:childTnLst>
+                        <p:par>
+                          <p:cTn id="9" fill="hold">
+                            <p:stCondLst>
+                              <p:cond delay="0"/>
+                            </p:stCondLst>
+                            <p:childTnLst>
+                              <p:par>
+                                <p:cTn id="10" presetID="10" presetClass="entr" presetSubtype="0" fill="hold" nodeType="clickEffect">
+                                  <p:stCondLst>
+                                    <p:cond delay="0"/>
+                                  </p:stCondLst>
+                                  <p:childTnLst>
+                                    <p:set>
+                                      <p:cBhvr>
+                                        <p:cTn id="11" dur="1" fill="hold">
+                                          <p:stCondLst>
+                                            <p:cond delay="0"/>
+                                          </p:stCondLst>
+                                        </p:cTn>
+                                        <p:tgtEl>
+                                          <p:spTgt spid="3">
+                                            <p:txEl>
+                                              <p:pRg st="2" end="2"/>
+                                            </p:txEl>
+                                          </p:spTgt>
+                                        </p:tgtEl>
+                                        <p:attrNameLst>
+                                          <p:attrName>style.visibility</p:attrName>
+                                        </p:attrNameLst>
+                                      </p:cBhvr>
+                                      <p:to>
+                                        <p:strVal val="visible"/>
+                                      </p:to>
+                                    </p:set>
+                                    <p:animEffect transition="in" filter="fade">
+                                      <p:cBhvr>
+                                        <p:cTn id="12" dur="500"/>
+                                        <p:tgtEl>
+                                          <p:spTgt spid="3">
+                                            <p:txEl>
+                                              <p:pRg st="2" end="2"/>
+                                            </p:txEl>
+                                          </p:spTgt>
+                                        </p:tgtEl>
+                                      </p:cBhvr>
+                                    </p:animEffect>
+                                  </p:childTnLst>
+                                </p:cTn>
+                              </p:par>
+                            </p:childTnLst>
+                          </p:cTn>
+                        </p:par>
+                      </p:childTnLst>
+                    </p:cTn>
+                  </p:par>
+                </p:childTnLst>
+              </p:cTn>
+              <p:prevCondLst>
+                <p:cond evt="onPrev" delay="0">
+                  <p:tgtEl>
+                    <p:sldTgt/>
+                  </p:tgtEl>
+                </p:cond>
+              </p:prevCondLst>
+              <p:nextCondLst>
+                <p:cond evt="onNext" delay="0">
+                  <p:tgtEl>
+                    <p:sldTgt/>
+                  </p:tgtEl>
+                </p:cond>
+              </p:nextCondLst>
+            </p:seq>
+          </p:childTnLst>
+        </p:cTn>
+      </p:par>
+    </p:tnLst>
+  </p:timing>
+</p:sld>
+</file>
+
+<file path=ppt/slides/slide3.xml><?xml version="1.0" encoding="utf-8"?>
+<p:sld xmlns:a="http://schemas.openxmlformats.org/drawingml/2006/main" xmlns:r="http://schemas.openxmlformats.org/officeDocument/2006/relationships" xmlns:p="http://schemas.openxmlformats.org/presentationml/2006/main">
+  <p:cSld>
+    <p:bg>
+      <p:bgPr>
+        <a:solidFill>
+          <a:schemeClr val="bg1"/>
+        </a:solidFill>
+        <a:effectLst/>
+      </p:bgPr>
+    </p:bg>
+    <p:spTree>
+      <p:nvGrpSpPr>
+        <p:cNvPr id="1" name=""/>
+        <p:cNvGrpSpPr/>
+        <p:nvPr/>
+      </p:nvGrpSpPr>
+      <p:grpSpPr>
+        <a:xfrm>
+          <a:off x="0" y="0"/>
+          <a:ext cx="0" cy="0"/>
+          <a:chOff x="0" y="0"/>
+          <a:chExt cx="0" cy="0"/>
+        </a:xfrm>
+      </p:grpSpPr>
+      <p:pic>
+        <p:nvPicPr>
+          <p:cNvPr id="5" name="Content Placeholder 4">
+            <a:extLst>
+              <a:ext uri="{FF2B5EF4-FFF2-40B4-BE49-F238E27FC236}">
+                <a16:creationId xmlns:a16="http://schemas.microsoft.com/office/drawing/2014/main" id="{F27F841D-6571-7A76-B532-8F24B8A10C2F}"/>
+              </a:ext>
+            </a:extLst>
+          </p:cNvPr>
+          <p:cNvPicPr>
+            <a:picLocks noGrp="1" noChangeAspect="1"/>
+          </p:cNvPicPr>
+          <p:nvPr>
+            <p:ph idx="1"/>
+          </p:nvPr>
+        </p:nvPicPr>
+        <p:blipFill>
+          <a:blip r:embed="rId3"/>
+          <a:stretch>
+            <a:fillRect/>
+          </a:stretch>
+        </p:blipFill>
+        <p:spPr>
+          <a:xfrm>
+            <a:off x="1938485" y="643466"/>
+            <a:ext cx="8315029" cy="5571067"/>
+          </a:xfrm>
+          <a:prstGeom prst="rect">
+            <a:avLst/>
+          </a:prstGeom>
+        </p:spPr>
+      </p:pic>
+    </p:spTree>
+    <p:extLst>
+      <p:ext uri="{BB962C8B-B14F-4D97-AF65-F5344CB8AC3E}">
+        <p14:creationId xmlns:p14="http://schemas.microsoft.com/office/powerpoint/2010/main" val="3509728695"/>
+      </p:ext>
+    </p:extLst>
+  </p:cSld>
+  <p:clrMapOvr>
+    <a:masterClrMapping/>
+  </p:clrMapOvr>
+  <mc:AlternateContent xmlns:mc="http://schemas.openxmlformats.org/markup-compatibility/2006">
+    <mc:Choice xmlns:p14="http://schemas.microsoft.com/office/powerpoint/2010/main" Requires="p14">
+      <p:transition spd="med" p14:dur="700">
+        <p:fade/>
+      </p:transition>
+    </mc:Choice>
+    <mc:Fallback>
+      <p:transition spd="med">
+        <p:fade/>
+      </p:transition>
+    </mc:Fallback>
+  </mc:AlternateContent>
+</p:sld>
+</file>
+
 <file path=ppt/theme/theme1.xml><?xml version="1.0" encoding="utf-8"?>
 <a:theme xmlns:a="http://schemas.openxmlformats.org/drawingml/2006/main" name="Office Theme">
   <a:themeElements>
@@ -3722,4 +4545,299 @@
     </a:ext>
   </a:extLst>
 </a:theme>
+</file>
+
+<file path=ppt/theme/theme2.xml><?xml version="1.0" encoding="utf-8"?>
+<a:theme xmlns:a="http://schemas.openxmlformats.org/drawingml/2006/main" name="Office Theme">
+  <a:themeElements>
+    <a:clrScheme name="Office">
+      <a:dk1>
+        <a:sysClr val="windowText" lastClr="000000"/>
+      </a:dk1>
+      <a:lt1>
+        <a:sysClr val="window" lastClr="FFFFFF"/>
+      </a:lt1>
+      <a:dk2>
+        <a:srgbClr val="44546A"/>
+      </a:dk2>
+      <a:lt2>
+        <a:srgbClr val="E7E6E6"/>
+      </a:lt2>
+      <a:accent1>
+        <a:srgbClr val="4472C4"/>
+      </a:accent1>
+      <a:accent2>
+        <a:srgbClr val="ED7D31"/>
+      </a:accent2>
+      <a:accent3>
+        <a:srgbClr val="A5A5A5"/>
+      </a:accent3>
+      <a:accent4>
+        <a:srgbClr val="FFC000"/>
+      </a:accent4>
+      <a:accent5>
+        <a:srgbClr val="5B9BD5"/>
+      </a:accent5>
+      <a:accent6>
+        <a:srgbClr val="70AD47"/>
+      </a:accent6>
+      <a:hlink>
+        <a:srgbClr val="0563C1"/>
+      </a:hlink>
+      <a:folHlink>
+        <a:srgbClr val="954F72"/>
+      </a:folHlink>
+    </a:clrScheme>
+    <a:fontScheme name="Office">
+      <a:majorFont>
+        <a:latin typeface="Calibri Light" panose="020F0302020204030204"/>
+        <a:ea typeface=""/>
+        <a:cs typeface=""/>
+        <a:font script="Jpan" typeface="游ゴシック Light"/>
+        <a:font script="Hang" typeface="맑은 고딕"/>
+        <a:font script="Hans" typeface="等线 Light"/>
+        <a:font script="Hant" typeface="新細明體"/>
+        <a:font script="Arab" typeface="Times New Roman"/>
+        <a:font script="Hebr" typeface="Times New Roman"/>
+        <a:font script="Thai" typeface="Angsana New"/>
+        <a:font script="Ethi" typeface="Nyala"/>
+        <a:font script="Beng" typeface="Vrinda"/>
+        <a:font script="Gujr" typeface="Shruti"/>
+        <a:font script="Khmr" typeface="MoolBoran"/>
+        <a:font script="Knda" typeface="Tunga"/>
+        <a:font script="Guru" typeface="Raavi"/>
+        <a:font script="Cans" typeface="Euphemia"/>
+        <a:font script="Cher" typeface="Plantagenet Cherokee"/>
+        <a:font script="Yiii" typeface="Microsoft Yi Baiti"/>
+        <a:font script="Tibt" typeface="Microsoft Himalaya"/>
+        <a:font script="Thaa" typeface="MV Boli"/>
+        <a:font script="Deva" typeface="Mangal"/>
+        <a:font script="Telu" typeface="Gautami"/>
+        <a:font script="Taml" typeface="Latha"/>
+        <a:font script="Syrc" typeface="Estrangelo Edessa"/>
+        <a:font script="Orya" typeface="Kalinga"/>
+        <a:font script="Mlym" typeface="Kartika"/>
+        <a:font script="Laoo" typeface="DokChampa"/>
+        <a:font script="Sinh" typeface="Iskoola Pota"/>
+        <a:font script="Mong" typeface="Mongolian Baiti"/>
+        <a:font script="Viet" typeface="Times New Roman"/>
+        <a:font script="Uigh" typeface="Microsoft Uighur"/>
+        <a:font script="Geor" typeface="Sylfaen"/>
+        <a:font script="Armn" typeface="Arial"/>
+        <a:font script="Bugi" typeface="Leelawadee UI"/>
+        <a:font script="Bopo" typeface="Microsoft JhengHei"/>
+        <a:font script="Java" typeface="Javanese Text"/>
+        <a:font script="Lisu" typeface="Segoe UI"/>
+        <a:font script="Mymr" typeface="Myanmar Text"/>
+        <a:font script="Nkoo" typeface="Ebrima"/>
+        <a:font script="Olck" typeface="Nirmala UI"/>
+        <a:font script="Osma" typeface="Ebrima"/>
+        <a:font script="Phag" typeface="Phagspa"/>
+        <a:font script="Syrn" typeface="Estrangelo Edessa"/>
+        <a:font script="Syrj" typeface="Estrangelo Edessa"/>
+        <a:font script="Syre" typeface="Estrangelo Edessa"/>
+        <a:font script="Sora" typeface="Nirmala UI"/>
+        <a:font script="Tale" typeface="Microsoft Tai Le"/>
+        <a:font script="Talu" typeface="Microsoft New Tai Lue"/>
+        <a:font script="Tfng" typeface="Ebrima"/>
+      </a:majorFont>
+      <a:minorFont>
+        <a:latin typeface="Calibri" panose="020F0502020204030204"/>
+        <a:ea typeface=""/>
+        <a:cs typeface=""/>
+        <a:font script="Jpan" typeface="游ゴシック"/>
+        <a:font script="Hang" typeface="맑은 고딕"/>
+        <a:font script="Hans" typeface="等线"/>
+        <a:font script="Hant" typeface="新細明體"/>
+        <a:font script="Arab" typeface="Arial"/>
+        <a:font script="Hebr" typeface="Arial"/>
+        <a:font script="Thai" typeface="Cordia New"/>
+        <a:font script="Ethi" typeface="Nyala"/>
+        <a:font script="Beng" typeface="Vrinda"/>
+        <a:font script="Gujr" typeface="Shruti"/>
+        <a:font script="Khmr" typeface="DaunPenh"/>
+        <a:font script="Knda" typeface="Tunga"/>
+        <a:font script="Guru" typeface="Raavi"/>
+        <a:font script="Cans" typeface="Euphemia"/>
+        <a:font script="Cher" typeface="Plantagenet Cherokee"/>
+        <a:font script="Yiii" typeface="Microsoft Yi Baiti"/>
+        <a:font script="Tibt" typeface="Microsoft Himalaya"/>
+        <a:font script="Thaa" typeface="MV Boli"/>
+        <a:font script="Deva" typeface="Mangal"/>
+        <a:font script="Telu" typeface="Gautami"/>
+        <a:font script="Taml" typeface="Latha"/>
+        <a:font script="Syrc" typeface="Estrangelo Edessa"/>
+        <a:font script="Orya" typeface="Kalinga"/>
+        <a:font script="Mlym" typeface="Kartika"/>
+        <a:font script="Laoo" typeface="DokChampa"/>
+        <a:font script="Sinh" typeface="Iskoola Pota"/>
+        <a:font script="Mong" typeface="Mongolian Baiti"/>
+        <a:font script="Viet" typeface="Arial"/>
+        <a:font script="Uigh" typeface="Microsoft Uighur"/>
+        <a:font script="Geor" typeface="Sylfaen"/>
+        <a:font script="Armn" typeface="Arial"/>
+        <a:font script="Bugi" typeface="Leelawadee UI"/>
+        <a:font script="Bopo" typeface="Microsoft JhengHei"/>
+        <a:font script="Java" typeface="Javanese Text"/>
+        <a:font script="Lisu" typeface="Segoe UI"/>
+        <a:font script="Mymr" typeface="Myanmar Text"/>
+        <a:font script="Nkoo" typeface="Ebrima"/>
+        <a:font script="Olck" typeface="Nirmala UI"/>
+        <a:font script="Osma" typeface="Ebrima"/>
+        <a:font script="Phag" typeface="Phagspa"/>
+        <a:font script="Syrn" typeface="Estrangelo Edessa"/>
+        <a:font script="Syrj" typeface="Estrangelo Edessa"/>
+        <a:font script="Syre" typeface="Estrangelo Edessa"/>
+        <a:font script="Sora" typeface="Nirmala UI"/>
+        <a:font script="Tale" typeface="Microsoft Tai Le"/>
+        <a:font script="Talu" typeface="Microsoft New Tai Lue"/>
+        <a:font script="Tfng" typeface="Ebrima"/>
+      </a:minorFont>
+    </a:fontScheme>
+    <a:fmtScheme name="Office">
+      <a:fillStyleLst>
+        <a:solidFill>
+          <a:schemeClr val="phClr"/>
+        </a:solidFill>
+        <a:gradFill rotWithShape="1">
+          <a:gsLst>
+            <a:gs pos="0">
+              <a:schemeClr val="phClr">
+                <a:lumMod val="110000"/>
+                <a:satMod val="105000"/>
+                <a:tint val="67000"/>
+              </a:schemeClr>
+            </a:gs>
+            <a:gs pos="50000">
+              <a:schemeClr val="phClr">
+                <a:lumMod val="105000"/>
+                <a:satMod val="103000"/>
+                <a:tint val="73000"/>
+              </a:schemeClr>
+            </a:gs>
+            <a:gs pos="100000">
+              <a:schemeClr val="phClr">
+                <a:lumMod val="105000"/>
+                <a:satMod val="109000"/>
+                <a:tint val="81000"/>
+              </a:schemeClr>
+            </a:gs>
+          </a:gsLst>
+          <a:lin ang="5400000" scaled="0"/>
+        </a:gradFill>
+        <a:gradFill rotWithShape="1">
+          <a:gsLst>
+            <a:gs pos="0">
+              <a:schemeClr val="phClr">
+                <a:satMod val="103000"/>
+                <a:lumMod val="102000"/>
+                <a:tint val="94000"/>
+              </a:schemeClr>
+            </a:gs>
+            <a:gs pos="50000">
+              <a:schemeClr val="phClr">
+                <a:satMod val="110000"/>
+                <a:lumMod val="100000"/>
+                <a:shade val="100000"/>
+              </a:schemeClr>
+            </a:gs>
+            <a:gs pos="100000">
+              <a:schemeClr val="phClr">
+                <a:lumMod val="99000"/>
+                <a:satMod val="120000"/>
+                <a:shade val="78000"/>
+              </a:schemeClr>
+            </a:gs>
+          </a:gsLst>
+          <a:lin ang="5400000" scaled="0"/>
+        </a:gradFill>
+      </a:fillStyleLst>
+      <a:lnStyleLst>
+        <a:ln w="6350" cap="flat" cmpd="sng" algn="ctr">
+          <a:solidFill>
+            <a:schemeClr val="phClr"/>
+          </a:solidFill>
+          <a:prstDash val="solid"/>
+          <a:miter lim="800000"/>
+        </a:ln>
+        <a:ln w="12700" cap="flat" cmpd="sng" algn="ctr">
+          <a:solidFill>
+            <a:schemeClr val="phClr"/>
+          </a:solidFill>
+          <a:prstDash val="solid"/>
+          <a:miter lim="800000"/>
+        </a:ln>
+        <a:ln w="19050" cap="flat" cmpd="sng" algn="ctr">
+          <a:solidFill>
+            <a:schemeClr val="phClr"/>
+          </a:solidFill>
+          <a:prstDash val="solid"/>
+          <a:miter lim="800000"/>
+        </a:ln>
+      </a:lnStyleLst>
+      <a:effectStyleLst>
+        <a:effectStyle>
+          <a:effectLst/>
+        </a:effectStyle>
+        <a:effectStyle>
+          <a:effectLst/>
+        </a:effectStyle>
+        <a:effectStyle>
+          <a:effectLst>
+            <a:outerShdw blurRad="57150" dist="19050" dir="5400000" algn="ctr" rotWithShape="0">
+              <a:srgbClr val="000000">
+                <a:alpha val="63000"/>
+              </a:srgbClr>
+            </a:outerShdw>
+          </a:effectLst>
+        </a:effectStyle>
+      </a:effectStyleLst>
+      <a:bgFillStyleLst>
+        <a:solidFill>
+          <a:schemeClr val="phClr"/>
+        </a:solidFill>
+        <a:solidFill>
+          <a:schemeClr val="phClr">
+            <a:tint val="95000"/>
+            <a:satMod val="170000"/>
+          </a:schemeClr>
+        </a:solidFill>
+        <a:gradFill rotWithShape="1">
+          <a:gsLst>
+            <a:gs pos="0">
+              <a:schemeClr val="phClr">
+                <a:tint val="93000"/>
+                <a:satMod val="150000"/>
+                <a:shade val="98000"/>
+                <a:lumMod val="102000"/>
+              </a:schemeClr>
+            </a:gs>
+            <a:gs pos="50000">
+              <a:schemeClr val="phClr">
+                <a:tint val="98000"/>
+                <a:satMod val="130000"/>
+                <a:shade val="90000"/>
+                <a:lumMod val="103000"/>
+              </a:schemeClr>
+            </a:gs>
+            <a:gs pos="100000">
+              <a:schemeClr val="phClr">
+                <a:shade val="63000"/>
+                <a:satMod val="120000"/>
+              </a:schemeClr>
+            </a:gs>
+          </a:gsLst>
+          <a:lin ang="5400000" scaled="0"/>
+        </a:gradFill>
+      </a:bgFillStyleLst>
+    </a:fmtScheme>
+  </a:themeElements>
+  <a:objectDefaults/>
+  <a:extraClrSchemeLst/>
+  <a:extLst>
+    <a:ext uri="{05A4C25C-085E-4340-85A3-A5531E510DB2}">
+      <thm15:themeFamily xmlns:thm15="http://schemas.microsoft.com/office/thememl/2012/main" name="Office Theme 2013 - 2022" id="{62F939B6-93AF-4DB8-9C6B-D6C7DFDC589F}" vid="{4A3C46E8-61CC-4603-A589-7422A47A8E4A}"/>
+    </a:ext>
+  </a:extLst>
+</a:theme>
 </file>
</xml_diff>

<commit_message>
Finished Slides_5.pptx (short) and first of the three TDs
</commit_message>
<xml_diff>
--- a/Slides_5.pptx
+++ b/Slides_5.pptx
@@ -5,12 +5,13 @@
     <p:sldMasterId id="2147483648" r:id="rId1"/>
   </p:sldMasterIdLst>
   <p:notesMasterIdLst>
-    <p:notesMasterId r:id="rId5"/>
+    <p:notesMasterId r:id="rId6"/>
   </p:notesMasterIdLst>
   <p:sldIdLst>
     <p:sldId id="256" r:id="rId2"/>
     <p:sldId id="257" r:id="rId3"/>
     <p:sldId id="258" r:id="rId4"/>
+    <p:sldId id="259" r:id="rId5"/>
   </p:sldIdLst>
   <p:sldSz cx="12192000" cy="6858000"/>
   <p:notesSz cx="6858000" cy="9144000"/>
@@ -546,7 +547,7 @@
           </a:p>
           <a:p>
             <a:r>
-              <a:rPr lang="en-US" b="0" i="0">
+              <a:rPr lang="en-US" b="0" i="0" dirty="0">
                 <a:solidFill>
                   <a:srgbClr val="D1D5DB"/>
                 </a:solidFill>
@@ -4249,6 +4250,100 @@
       </p:transition>
     </mc:Fallback>
   </mc:AlternateContent>
+</p:sld>
+</file>
+
+<file path=ppt/slides/slide4.xml><?xml version="1.0" encoding="utf-8"?>
+<p:sld xmlns:a="http://schemas.openxmlformats.org/drawingml/2006/main" xmlns:r="http://schemas.openxmlformats.org/officeDocument/2006/relationships" xmlns:p="http://schemas.openxmlformats.org/presentationml/2006/main">
+  <p:cSld>
+    <p:spTree>
+      <p:nvGrpSpPr>
+        <p:cNvPr id="1" name=""/>
+        <p:cNvGrpSpPr/>
+        <p:nvPr/>
+      </p:nvGrpSpPr>
+      <p:grpSpPr>
+        <a:xfrm>
+          <a:off x="0" y="0"/>
+          <a:ext cx="0" cy="0"/>
+          <a:chOff x="0" y="0"/>
+          <a:chExt cx="0" cy="0"/>
+        </a:xfrm>
+      </p:grpSpPr>
+      <p:sp>
+        <p:nvSpPr>
+          <p:cNvPr id="2" name="Title 1">
+            <a:extLst>
+              <a:ext uri="{FF2B5EF4-FFF2-40B4-BE49-F238E27FC236}">
+                <a16:creationId xmlns:a16="http://schemas.microsoft.com/office/drawing/2014/main" id="{F48A5DF5-9273-5D6E-84BD-2AF0BF7C3792}"/>
+              </a:ext>
+            </a:extLst>
+          </p:cNvPr>
+          <p:cNvSpPr>
+            <a:spLocks noGrp="1"/>
+          </p:cNvSpPr>
+          <p:nvPr>
+            <p:ph type="title"/>
+          </p:nvPr>
+        </p:nvSpPr>
+        <p:spPr/>
+        <p:txBody>
+          <a:bodyPr/>
+          <a:lstStyle/>
+          <a:p>
+            <a:r>
+              <a:rPr lang="en-GB" dirty="0"/>
+              <a:t>What does it look like in PyTorch</a:t>
+            </a:r>
+          </a:p>
+        </p:txBody>
+      </p:sp>
+      <p:sp>
+        <p:nvSpPr>
+          <p:cNvPr id="3" name="Content Placeholder 2">
+            <a:extLst>
+              <a:ext uri="{FF2B5EF4-FFF2-40B4-BE49-F238E27FC236}">
+                <a16:creationId xmlns:a16="http://schemas.microsoft.com/office/drawing/2014/main" id="{78DE23D1-93AB-510E-44AD-3DEF6577A04B}"/>
+              </a:ext>
+            </a:extLst>
+          </p:cNvPr>
+          <p:cNvSpPr>
+            <a:spLocks noGrp="1"/>
+          </p:cNvSpPr>
+          <p:nvPr>
+            <p:ph idx="1"/>
+          </p:nvPr>
+        </p:nvSpPr>
+        <p:spPr/>
+        <p:txBody>
+          <a:bodyPr/>
+          <a:lstStyle/>
+          <a:p>
+            <a:pPr marL="0" indent="0" algn="just">
+              <a:buNone/>
+            </a:pPr>
+            <a:r>
+              <a:rPr lang="en-US" dirty="0"/>
+              <a:t>-&gt; DL_Practice_5_a_solutions.ipynb </a:t>
+            </a:r>
+            <a:r>
+              <a:rPr lang="en-US"/>
+              <a:t>on Github</a:t>
+            </a:r>
+            <a:endParaRPr lang="en-US" dirty="0"/>
+          </a:p>
+        </p:txBody>
+      </p:sp>
+    </p:spTree>
+    <p:extLst>
+      <p:ext uri="{BB962C8B-B14F-4D97-AF65-F5344CB8AC3E}">
+        <p14:creationId xmlns:p14="http://schemas.microsoft.com/office/powerpoint/2010/main" val="3854688518"/>
+      </p:ext>
+    </p:extLst>
+  </p:cSld>
+  <p:clrMapOvr>
+    <a:masterClrMapping/>
+  </p:clrMapOvr>
 </p:sld>
 </file>
 

</xml_diff>